<commit_message>
Update Block1 of ONIP
</commit_message>
<xml_diff>
--- a/ONIP/onip_b0_intro/B0_0_Outils_Methodes.pptx
+++ b/ONIP/onip_b0_intro/B0_0_Outils_Methodes.pptx
@@ -5,7 +5,7 @@
     <p:sldMasterId id="2147483711" r:id="rId1"/>
   </p:sldMasterIdLst>
   <p:notesMasterIdLst>
-    <p:notesMasterId r:id="rId27"/>
+    <p:notesMasterId r:id="rId26"/>
   </p:notesMasterIdLst>
   <p:sldIdLst>
     <p:sldId id="256" r:id="rId2"/>
@@ -30,9 +30,8 @@
     <p:sldId id="259" r:id="rId21"/>
     <p:sldId id="263" r:id="rId22"/>
     <p:sldId id="261" r:id="rId23"/>
-    <p:sldId id="260" r:id="rId24"/>
-    <p:sldId id="281" r:id="rId25"/>
-    <p:sldId id="282" r:id="rId26"/>
+    <p:sldId id="281" r:id="rId24"/>
+    <p:sldId id="282" r:id="rId25"/>
   </p:sldIdLst>
   <p:sldSz cx="12192000" cy="6858000"/>
   <p:notesSz cx="6858000" cy="9144000"/>
@@ -221,7 +220,7 @@
           <a:p>
             <a:fld id="{7C2ED78D-DC5F-4349-9BB1-6BA0129AAA21}" type="datetimeFigureOut">
               <a:rPr lang="fr-FR" smtClean="0"/>
-              <a:t>04/04/2024</a:t>
+              <a:t>24/04/2024</a:t>
             </a:fld>
             <a:endParaRPr lang="fr-FR"/>
           </a:p>
@@ -1076,7 +1075,7 @@
           <a:p>
             <a:fld id="{02AC24A9-CCB6-4F8D-B8DB-C2F3692CFA5A}" type="datetimeFigureOut">
               <a:rPr lang="en-US" smtClean="0"/>
-              <a:t>4/4/2024</a:t>
+              <a:t>4/24/2024</a:t>
             </a:fld>
             <a:endParaRPr lang="en-US" dirty="0"/>
           </a:p>
@@ -1446,7 +1445,7 @@
           <a:p>
             <a:fld id="{02AC24A9-CCB6-4F8D-B8DB-C2F3692CFA5A}" type="datetimeFigureOut">
               <a:rPr lang="en-US" smtClean="0"/>
-              <a:t>4/4/2024</a:t>
+              <a:t>4/24/2024</a:t>
             </a:fld>
             <a:endParaRPr lang="en-US"/>
           </a:p>
@@ -1655,7 +1654,7 @@
           <a:p>
             <a:fld id="{02AC24A9-CCB6-4F8D-B8DB-C2F3692CFA5A}" type="datetimeFigureOut">
               <a:rPr lang="en-US" smtClean="0"/>
-              <a:t>4/4/2024</a:t>
+              <a:t>4/24/2024</a:t>
             </a:fld>
             <a:endParaRPr lang="en-US"/>
           </a:p>
@@ -2125,7 +2124,7 @@
           <a:p>
             <a:fld id="{02AC24A9-CCB6-4F8D-B8DB-C2F3692CFA5A}" type="datetimeFigureOut">
               <a:rPr lang="en-US" smtClean="0"/>
-              <a:t>4/4/2024</a:t>
+              <a:t>4/24/2024</a:t>
             </a:fld>
             <a:endParaRPr lang="en-US"/>
           </a:p>
@@ -2579,7 +2578,7 @@
           <a:p>
             <a:fld id="{02AC24A9-CCB6-4F8D-B8DB-C2F3692CFA5A}" type="datetimeFigureOut">
               <a:rPr lang="en-US" smtClean="0"/>
-              <a:t>4/4/2024</a:t>
+              <a:t>4/24/2024</a:t>
             </a:fld>
             <a:endParaRPr lang="en-US"/>
           </a:p>
@@ -3111,7 +3110,7 @@
           <a:p>
             <a:fld id="{02AC24A9-CCB6-4F8D-B8DB-C2F3692CFA5A}" type="datetimeFigureOut">
               <a:rPr lang="en-US" smtClean="0"/>
-              <a:t>4/4/2024</a:t>
+              <a:t>4/24/2024</a:t>
             </a:fld>
             <a:endParaRPr lang="en-US"/>
           </a:p>
@@ -3810,7 +3809,7 @@
           <a:p>
             <a:fld id="{02AC24A9-CCB6-4F8D-B8DB-C2F3692CFA5A}" type="datetimeFigureOut">
               <a:rPr lang="en-US" smtClean="0"/>
-              <a:t>4/4/2024</a:t>
+              <a:t>4/24/2024</a:t>
             </a:fld>
             <a:endParaRPr lang="en-US"/>
           </a:p>
@@ -4139,7 +4138,7 @@
           <a:p>
             <a:fld id="{02AC24A9-CCB6-4F8D-B8DB-C2F3692CFA5A}" type="datetimeFigureOut">
               <a:rPr lang="en-US" smtClean="0"/>
-              <a:t>4/4/2024</a:t>
+              <a:t>4/24/2024</a:t>
             </a:fld>
             <a:endParaRPr lang="en-US"/>
           </a:p>
@@ -4252,7 +4251,7 @@
           <a:p>
             <a:fld id="{02AC24A9-CCB6-4F8D-B8DB-C2F3692CFA5A}" type="datetimeFigureOut">
               <a:rPr lang="en-US" smtClean="0"/>
-              <a:t>4/4/2024</a:t>
+              <a:t>4/24/2024</a:t>
             </a:fld>
             <a:endParaRPr lang="en-US"/>
           </a:p>
@@ -4747,7 +4746,7 @@
           <a:p>
             <a:fld id="{02AC24A9-CCB6-4F8D-B8DB-C2F3692CFA5A}" type="datetimeFigureOut">
               <a:rPr lang="en-US" smtClean="0"/>
-              <a:t>4/4/2024</a:t>
+              <a:t>4/24/2024</a:t>
             </a:fld>
             <a:endParaRPr lang="en-US" dirty="0"/>
           </a:p>
@@ -5224,7 +5223,7 @@
           <a:p>
             <a:fld id="{02AC24A9-CCB6-4F8D-B8DB-C2F3692CFA5A}" type="datetimeFigureOut">
               <a:rPr lang="en-US" smtClean="0"/>
-              <a:t>4/4/2024</a:t>
+              <a:t>4/24/2024</a:t>
             </a:fld>
             <a:endParaRPr lang="en-US"/>
           </a:p>
@@ -5467,7 +5466,7 @@
           <a:p>
             <a:fld id="{02AC24A9-CCB6-4F8D-B8DB-C2F3692CFA5A}" type="datetimeFigureOut">
               <a:rPr lang="en-US" smtClean="0"/>
-              <a:t>4/4/2024</a:t>
+              <a:t>4/24/2024</a:t>
             </a:fld>
             <a:endParaRPr lang="en-US"/>
           </a:p>
@@ -6606,6 +6605,47 @@
           </a:p>
         </p:txBody>
       </p:sp>
+      <p:sp>
+        <p:nvSpPr>
+          <p:cNvPr id="6" name="ZoneTexte 5">
+            <a:extLst>
+              <a:ext uri="{FF2B5EF4-FFF2-40B4-BE49-F238E27FC236}">
+                <a16:creationId xmlns:a16="http://schemas.microsoft.com/office/drawing/2014/main" id="{A650E868-52DC-8546-634A-3BE0633C2BE4}"/>
+              </a:ext>
+            </a:extLst>
+          </p:cNvPr>
+          <p:cNvSpPr txBox="1"/>
+          <p:nvPr/>
+        </p:nvSpPr>
+        <p:spPr>
+          <a:xfrm rot="19731946">
+            <a:off x="270437" y="4945119"/>
+            <a:ext cx="1275734" cy="369332"/>
+          </a:xfrm>
+          <a:prstGeom prst="rect">
+            <a:avLst/>
+          </a:prstGeom>
+          <a:solidFill>
+            <a:srgbClr val="FF0000"/>
+          </a:solidFill>
+        </p:spPr>
+        <p:txBody>
+          <a:bodyPr wrap="none" rtlCol="0">
+            <a:spAutoFit/>
+          </a:bodyPr>
+          <a:lstStyle/>
+          <a:p>
+            <a:r>
+              <a:rPr lang="fr-FR" b="1" dirty="0">
+                <a:solidFill>
+                  <a:schemeClr val="bg1"/>
+                </a:solidFill>
+              </a:rPr>
+              <a:t>A REVOIR</a:t>
+            </a:r>
+          </a:p>
+        </p:txBody>
+      </p:sp>
     </p:spTree>
     <p:extLst>
       <p:ext uri="{BB962C8B-B14F-4D97-AF65-F5344CB8AC3E}">
@@ -7119,6 +7159,47 @@
           </a:p>
         </p:txBody>
       </p:sp>
+      <p:sp>
+        <p:nvSpPr>
+          <p:cNvPr id="6" name="ZoneTexte 5">
+            <a:extLst>
+              <a:ext uri="{FF2B5EF4-FFF2-40B4-BE49-F238E27FC236}">
+                <a16:creationId xmlns:a16="http://schemas.microsoft.com/office/drawing/2014/main" id="{81D27B8E-759E-2A59-51B6-3994FE92309D}"/>
+              </a:ext>
+            </a:extLst>
+          </p:cNvPr>
+          <p:cNvSpPr txBox="1"/>
+          <p:nvPr/>
+        </p:nvSpPr>
+        <p:spPr>
+          <a:xfrm rot="19731946">
+            <a:off x="270437" y="4945119"/>
+            <a:ext cx="1275734" cy="369332"/>
+          </a:xfrm>
+          <a:prstGeom prst="rect">
+            <a:avLst/>
+          </a:prstGeom>
+          <a:solidFill>
+            <a:srgbClr val="FF0000"/>
+          </a:solidFill>
+        </p:spPr>
+        <p:txBody>
+          <a:bodyPr wrap="none" rtlCol="0">
+            <a:spAutoFit/>
+          </a:bodyPr>
+          <a:lstStyle/>
+          <a:p>
+            <a:r>
+              <a:rPr lang="fr-FR" b="1" dirty="0">
+                <a:solidFill>
+                  <a:schemeClr val="bg1"/>
+                </a:solidFill>
+              </a:rPr>
+              <a:t>A REVOIR</a:t>
+            </a:r>
+          </a:p>
+        </p:txBody>
+      </p:sp>
     </p:spTree>
     <p:extLst>
       <p:ext uri="{BB962C8B-B14F-4D97-AF65-F5344CB8AC3E}">
@@ -7370,6 +7451,47 @@
           </a:p>
         </p:txBody>
       </p:sp>
+      <p:sp>
+        <p:nvSpPr>
+          <p:cNvPr id="4" name="ZoneTexte 3">
+            <a:extLst>
+              <a:ext uri="{FF2B5EF4-FFF2-40B4-BE49-F238E27FC236}">
+                <a16:creationId xmlns:a16="http://schemas.microsoft.com/office/drawing/2014/main" id="{9AA9F70C-30DD-422B-3664-8FE5697ADEAA}"/>
+              </a:ext>
+            </a:extLst>
+          </p:cNvPr>
+          <p:cNvSpPr txBox="1"/>
+          <p:nvPr/>
+        </p:nvSpPr>
+        <p:spPr>
+          <a:xfrm rot="19731946">
+            <a:off x="270437" y="4945119"/>
+            <a:ext cx="1275734" cy="369332"/>
+          </a:xfrm>
+          <a:prstGeom prst="rect">
+            <a:avLst/>
+          </a:prstGeom>
+          <a:solidFill>
+            <a:srgbClr val="FF0000"/>
+          </a:solidFill>
+        </p:spPr>
+        <p:txBody>
+          <a:bodyPr wrap="none" rtlCol="0">
+            <a:spAutoFit/>
+          </a:bodyPr>
+          <a:lstStyle/>
+          <a:p>
+            <a:r>
+              <a:rPr lang="fr-FR" b="1" dirty="0">
+                <a:solidFill>
+                  <a:schemeClr val="bg1"/>
+                </a:solidFill>
+              </a:rPr>
+              <a:t>A REVOIR</a:t>
+            </a:r>
+          </a:p>
+        </p:txBody>
+      </p:sp>
     </p:spTree>
     <p:extLst>
       <p:ext uri="{BB962C8B-B14F-4D97-AF65-F5344CB8AC3E}">
@@ -7926,7 +8048,7 @@
           <a:p>
             <a:r>
               <a:rPr lang="fr-FR" sz="1600" dirty="0"/>
-              <a:t>Séance 4 : synthèse</a:t>
+              <a:t>Séance 4 : évaluation</a:t>
             </a:r>
           </a:p>
         </p:txBody>
@@ -8050,6 +8172,47 @@
             <a:r>
               <a:rPr lang="fr-FR" sz="1600" dirty="0"/>
               <a:t> : signal modulé en amplitude / acquisition numérique</a:t>
+            </a:r>
+          </a:p>
+        </p:txBody>
+      </p:sp>
+      <p:sp>
+        <p:nvSpPr>
+          <p:cNvPr id="4" name="ZoneTexte 3">
+            <a:extLst>
+              <a:ext uri="{FF2B5EF4-FFF2-40B4-BE49-F238E27FC236}">
+                <a16:creationId xmlns:a16="http://schemas.microsoft.com/office/drawing/2014/main" id="{AD2724CF-AAB2-02B7-C410-3D91B6A4D145}"/>
+              </a:ext>
+            </a:extLst>
+          </p:cNvPr>
+          <p:cNvSpPr txBox="1"/>
+          <p:nvPr/>
+        </p:nvSpPr>
+        <p:spPr>
+          <a:xfrm rot="19731946">
+            <a:off x="270437" y="4945119"/>
+            <a:ext cx="1275734" cy="369332"/>
+          </a:xfrm>
+          <a:prstGeom prst="rect">
+            <a:avLst/>
+          </a:prstGeom>
+          <a:solidFill>
+            <a:srgbClr val="FF0000"/>
+          </a:solidFill>
+        </p:spPr>
+        <p:txBody>
+          <a:bodyPr wrap="none" rtlCol="0">
+            <a:spAutoFit/>
+          </a:bodyPr>
+          <a:lstStyle/>
+          <a:p>
+            <a:r>
+              <a:rPr lang="fr-FR" b="1" dirty="0">
+                <a:solidFill>
+                  <a:schemeClr val="bg1"/>
+                </a:solidFill>
+              </a:rPr>
+              <a:t>A REVOIR</a:t>
             </a:r>
           </a:p>
         </p:txBody>
@@ -9458,21 +9621,7 @@
           <a:p>
             <a:r>
               <a:rPr lang="fr-FR" dirty="0"/>
-              <a:t>Résolution d’équations / de systèmes d’équations</a:t>
-            </a:r>
-          </a:p>
-          <a:p>
-            <a:pPr lvl="1"/>
-            <a:r>
-              <a:rPr lang="fr-FR" dirty="0"/>
-              <a:t>Symbolique</a:t>
-            </a:r>
-          </a:p>
-          <a:p>
-            <a:pPr lvl="1"/>
-            <a:r>
-              <a:rPr lang="fr-FR" dirty="0"/>
-              <a:t>Numérique</a:t>
+              <a:t>Résolution de systèmes d’équations</a:t>
             </a:r>
           </a:p>
           <a:p>
@@ -10615,6 +10764,47 @@
           </a:prstGeom>
         </p:spPr>
       </p:pic>
+      <p:sp>
+        <p:nvSpPr>
+          <p:cNvPr id="4" name="ZoneTexte 3">
+            <a:extLst>
+              <a:ext uri="{FF2B5EF4-FFF2-40B4-BE49-F238E27FC236}">
+                <a16:creationId xmlns:a16="http://schemas.microsoft.com/office/drawing/2014/main" id="{8FD39AAB-FC1C-78C2-6F34-81FB9AF66F9D}"/>
+              </a:ext>
+            </a:extLst>
+          </p:cNvPr>
+          <p:cNvSpPr txBox="1"/>
+          <p:nvPr/>
+        </p:nvSpPr>
+        <p:spPr>
+          <a:xfrm rot="19731946">
+            <a:off x="270437" y="4945119"/>
+            <a:ext cx="1275734" cy="369332"/>
+          </a:xfrm>
+          <a:prstGeom prst="rect">
+            <a:avLst/>
+          </a:prstGeom>
+          <a:solidFill>
+            <a:srgbClr val="FF0000"/>
+          </a:solidFill>
+        </p:spPr>
+        <p:txBody>
+          <a:bodyPr wrap="none" rtlCol="0">
+            <a:spAutoFit/>
+          </a:bodyPr>
+          <a:lstStyle/>
+          <a:p>
+            <a:r>
+              <a:rPr lang="fr-FR" b="1" dirty="0">
+                <a:solidFill>
+                  <a:schemeClr val="bg1"/>
+                </a:solidFill>
+              </a:rPr>
+              <a:t>A REVOIR</a:t>
+            </a:r>
+          </a:p>
+        </p:txBody>
+      </p:sp>
     </p:spTree>
     <p:extLst>
       <p:ext uri="{BB962C8B-B14F-4D97-AF65-F5344CB8AC3E}">
@@ -10629,250 +10819,6 @@
 </file>
 
 <file path=ppt/slides/slide23.xml><?xml version="1.0" encoding="utf-8"?>
-<p:sld xmlns:a="http://schemas.openxmlformats.org/drawingml/2006/main" xmlns:r="http://schemas.openxmlformats.org/officeDocument/2006/relationships" xmlns:p="http://schemas.openxmlformats.org/presentationml/2006/main">
-  <p:cSld>
-    <p:spTree>
-      <p:nvGrpSpPr>
-        <p:cNvPr id="1" name=""/>
-        <p:cNvGrpSpPr/>
-        <p:nvPr/>
-      </p:nvGrpSpPr>
-      <p:grpSpPr>
-        <a:xfrm>
-          <a:off x="0" y="0"/>
-          <a:ext cx="0" cy="0"/>
-          <a:chOff x="0" y="0"/>
-          <a:chExt cx="0" cy="0"/>
-        </a:xfrm>
-      </p:grpSpPr>
-      <p:sp>
-        <p:nvSpPr>
-          <p:cNvPr id="3" name="Espace réservé du contenu 2">
-            <a:extLst>
-              <a:ext uri="{FF2B5EF4-FFF2-40B4-BE49-F238E27FC236}">
-                <a16:creationId xmlns:a16="http://schemas.microsoft.com/office/drawing/2014/main" id="{E0BBB9DE-019C-C741-F224-494739D4B752}"/>
-              </a:ext>
-            </a:extLst>
-          </p:cNvPr>
-          <p:cNvSpPr>
-            <a:spLocks noGrp="1"/>
-          </p:cNvSpPr>
-          <p:nvPr>
-            <p:ph sz="half" idx="1"/>
-          </p:nvPr>
-        </p:nvSpPr>
-        <p:spPr>
-          <a:xfrm>
-            <a:off x="1115568" y="2478024"/>
-            <a:ext cx="10168128" cy="3694176"/>
-          </a:xfrm>
-        </p:spPr>
-        <p:txBody>
-          <a:bodyPr>
-            <a:normAutofit/>
-          </a:bodyPr>
-          <a:lstStyle/>
-          <a:p>
-            <a:r>
-              <a:rPr lang="fr-FR" dirty="0"/>
-              <a:t>Démystifier les langages de haut niveau</a:t>
-            </a:r>
-            <a:endParaRPr lang="fr-FR" b="1" dirty="0"/>
-          </a:p>
-          <a:p>
-            <a:pPr lvl="1"/>
-            <a:r>
-              <a:rPr lang="fr-FR" dirty="0"/>
-              <a:t>Quelques notions théoriques</a:t>
-            </a:r>
-          </a:p>
-          <a:p>
-            <a:pPr lvl="1"/>
-            <a:r>
-              <a:rPr lang="fr-FR" dirty="0"/>
-              <a:t>Des exemples pratiques en Python</a:t>
-            </a:r>
-          </a:p>
-          <a:p>
-            <a:r>
-              <a:rPr lang="fr-FR" dirty="0"/>
-              <a:t>Bonnes pratiques en Python</a:t>
-            </a:r>
-          </a:p>
-        </p:txBody>
-      </p:sp>
-      <p:sp>
-        <p:nvSpPr>
-          <p:cNvPr id="2" name="Titre 1">
-            <a:extLst>
-              <a:ext uri="{FF2B5EF4-FFF2-40B4-BE49-F238E27FC236}">
-                <a16:creationId xmlns:a16="http://schemas.microsoft.com/office/drawing/2014/main" id="{90162AE8-C1B0-5C56-8313-DEE494F38273}"/>
-              </a:ext>
-            </a:extLst>
-          </p:cNvPr>
-          <p:cNvSpPr>
-            <a:spLocks noGrp="1"/>
-          </p:cNvSpPr>
-          <p:nvPr>
-            <p:ph type="title"/>
-          </p:nvPr>
-        </p:nvSpPr>
-        <p:spPr/>
-        <p:txBody>
-          <a:bodyPr/>
-          <a:lstStyle/>
-          <a:p>
-            <a:r>
-              <a:rPr lang="fr-FR" dirty="0"/>
-              <a:t>Méthode de travail / Bloc 1</a:t>
-            </a:r>
-          </a:p>
-        </p:txBody>
-      </p:sp>
-      <p:pic>
-        <p:nvPicPr>
-          <p:cNvPr id="5" name="Image 4" descr="Une image contenant texte&#10;&#10;Description générée automatiquement">
-            <a:extLst>
-              <a:ext uri="{FF2B5EF4-FFF2-40B4-BE49-F238E27FC236}">
-                <a16:creationId xmlns:a16="http://schemas.microsoft.com/office/drawing/2014/main" id="{204ADC40-1D61-539F-22ED-6B21D67FBDE6}"/>
-              </a:ext>
-            </a:extLst>
-          </p:cNvPr>
-          <p:cNvPicPr>
-            <a:picLocks noChangeAspect="1"/>
-          </p:cNvPicPr>
-          <p:nvPr/>
-        </p:nvPicPr>
-        <p:blipFill>
-          <a:blip r:embed="rId2">
-            <a:extLst>
-              <a:ext uri="{28A0092B-C50C-407E-A947-70E740481C1C}">
-                <a14:useLocalDpi xmlns:a14="http://schemas.microsoft.com/office/drawing/2010/main" val="0"/>
-              </a:ext>
-            </a:extLst>
-          </a:blip>
-          <a:stretch>
-            <a:fillRect/>
-          </a:stretch>
-        </p:blipFill>
-        <p:spPr>
-          <a:xfrm>
-            <a:off x="202922" y="5934456"/>
-            <a:ext cx="1825291" cy="749808"/>
-          </a:xfrm>
-          <a:prstGeom prst="rect">
-            <a:avLst/>
-          </a:prstGeom>
-        </p:spPr>
-      </p:pic>
-      <p:pic>
-        <p:nvPicPr>
-          <p:cNvPr id="1026" name="Picture 2">
-            <a:extLst>
-              <a:ext uri="{FF2B5EF4-FFF2-40B4-BE49-F238E27FC236}">
-                <a16:creationId xmlns:a16="http://schemas.microsoft.com/office/drawing/2014/main" id="{EEC3CC6F-ADB4-888A-B18B-7044585F0661}"/>
-              </a:ext>
-            </a:extLst>
-          </p:cNvPr>
-          <p:cNvPicPr>
-            <a:picLocks noChangeAspect="1" noChangeArrowheads="1"/>
-          </p:cNvPicPr>
-          <p:nvPr/>
-        </p:nvPicPr>
-        <p:blipFill>
-          <a:blip r:embed="rId3">
-            <a:extLst>
-              <a:ext uri="{28A0092B-C50C-407E-A947-70E740481C1C}">
-                <a14:useLocalDpi xmlns:a14="http://schemas.microsoft.com/office/drawing/2010/main" val="0"/>
-              </a:ext>
-            </a:extLst>
-          </a:blip>
-          <a:srcRect/>
-          <a:stretch>
-            <a:fillRect/>
-          </a:stretch>
-        </p:blipFill>
-        <p:spPr bwMode="auto">
-          <a:xfrm>
-            <a:off x="3389364" y="4715256"/>
-            <a:ext cx="1047750" cy="1219200"/>
-          </a:xfrm>
-          <a:prstGeom prst="rect">
-            <a:avLst/>
-          </a:prstGeom>
-          <a:noFill/>
-          <a:extLst>
-            <a:ext uri="{909E8E84-426E-40DD-AFC4-6F175D3DCCD1}">
-              <a14:hiddenFill xmlns:a14="http://schemas.microsoft.com/office/drawing/2010/main">
-                <a:solidFill>
-                  <a:srgbClr val="FFFFFF"/>
-                </a:solidFill>
-              </a14:hiddenFill>
-            </a:ext>
-          </a:extLst>
-        </p:spPr>
-      </p:pic>
-      <p:pic>
-        <p:nvPicPr>
-          <p:cNvPr id="4" name="Picture 8" descr="Résultat de recherche d'images pour &quot;spyder logo&quot;">
-            <a:extLst>
-              <a:ext uri="{FF2B5EF4-FFF2-40B4-BE49-F238E27FC236}">
-                <a16:creationId xmlns:a16="http://schemas.microsoft.com/office/drawing/2014/main" id="{7D86E94E-1CE4-F45E-69EA-100C66B3A897}"/>
-              </a:ext>
-            </a:extLst>
-          </p:cNvPr>
-          <p:cNvPicPr>
-            <a:picLocks noChangeAspect="1" noChangeArrowheads="1"/>
-          </p:cNvPicPr>
-          <p:nvPr/>
-        </p:nvPicPr>
-        <p:blipFill>
-          <a:blip r:embed="rId4">
-            <a:extLst>
-              <a:ext uri="{28A0092B-C50C-407E-A947-70E740481C1C}">
-                <a14:useLocalDpi xmlns:a14="http://schemas.microsoft.com/office/drawing/2010/main" val="0"/>
-              </a:ext>
-            </a:extLst>
-          </a:blip>
-          <a:srcRect/>
-          <a:stretch>
-            <a:fillRect/>
-          </a:stretch>
-        </p:blipFill>
-        <p:spPr bwMode="auto">
-          <a:xfrm>
-            <a:off x="7506412" y="4846474"/>
-            <a:ext cx="1913528" cy="956764"/>
-          </a:xfrm>
-          <a:prstGeom prst="rect">
-            <a:avLst/>
-          </a:prstGeom>
-          <a:noFill/>
-          <a:extLst>
-            <a:ext uri="{909E8E84-426E-40DD-AFC4-6F175D3DCCD1}">
-              <a14:hiddenFill xmlns:a14="http://schemas.microsoft.com/office/drawing/2010/main">
-                <a:solidFill>
-                  <a:srgbClr val="FFFFFF"/>
-                </a:solidFill>
-              </a14:hiddenFill>
-            </a:ext>
-          </a:extLst>
-        </p:spPr>
-      </p:pic>
-    </p:spTree>
-    <p:extLst>
-      <p:ext uri="{BB962C8B-B14F-4D97-AF65-F5344CB8AC3E}">
-        <p14:creationId xmlns:p14="http://schemas.microsoft.com/office/powerpoint/2010/main" val="2211726380"/>
-      </p:ext>
-    </p:extLst>
-  </p:cSld>
-  <p:clrMapOvr>
-    <a:masterClrMapping/>
-  </p:clrMapOvr>
-</p:sld>
-</file>
-
-<file path=ppt/slides/slide24.xml><?xml version="1.0" encoding="utf-8"?>
 <p:sld xmlns:a="http://schemas.openxmlformats.org/drawingml/2006/main" xmlns:r="http://schemas.openxmlformats.org/officeDocument/2006/relationships" xmlns:p="http://schemas.openxmlformats.org/presentationml/2006/main">
   <p:cSld>
     <p:bg>
@@ -11375,7 +11321,7 @@
 </p:sld>
 </file>
 
-<file path=ppt/slides/slide25.xml><?xml version="1.0" encoding="utf-8"?>
+<file path=ppt/slides/slide24.xml><?xml version="1.0" encoding="utf-8"?>
 <p:sld xmlns:a="http://schemas.openxmlformats.org/drawingml/2006/main" xmlns:r="http://schemas.openxmlformats.org/officeDocument/2006/relationships" xmlns:p="http://schemas.openxmlformats.org/presentationml/2006/main">
   <p:cSld>
     <p:spTree>
@@ -11684,6 +11630,47 @@
           </a:prstGeom>
         </p:spPr>
       </p:pic>
+      <p:sp>
+        <p:nvSpPr>
+          <p:cNvPr id="4" name="ZoneTexte 3">
+            <a:extLst>
+              <a:ext uri="{FF2B5EF4-FFF2-40B4-BE49-F238E27FC236}">
+                <a16:creationId xmlns:a16="http://schemas.microsoft.com/office/drawing/2014/main" id="{8D1A2304-2192-0F26-4F8C-82EAC43C0B3C}"/>
+              </a:ext>
+            </a:extLst>
+          </p:cNvPr>
+          <p:cNvSpPr txBox="1"/>
+          <p:nvPr/>
+        </p:nvSpPr>
+        <p:spPr>
+          <a:xfrm rot="19731946">
+            <a:off x="270437" y="4945119"/>
+            <a:ext cx="1275734" cy="369332"/>
+          </a:xfrm>
+          <a:prstGeom prst="rect">
+            <a:avLst/>
+          </a:prstGeom>
+          <a:solidFill>
+            <a:srgbClr val="FF0000"/>
+          </a:solidFill>
+        </p:spPr>
+        <p:txBody>
+          <a:bodyPr wrap="none" rtlCol="0">
+            <a:spAutoFit/>
+          </a:bodyPr>
+          <a:lstStyle/>
+          <a:p>
+            <a:r>
+              <a:rPr lang="fr-FR" b="1" dirty="0">
+                <a:solidFill>
+                  <a:schemeClr val="bg1"/>
+                </a:solidFill>
+              </a:rPr>
+              <a:t>A REVOIR</a:t>
+            </a:r>
+          </a:p>
+        </p:txBody>
+      </p:sp>
     </p:spTree>
     <p:extLst>
       <p:ext uri="{BB962C8B-B14F-4D97-AF65-F5344CB8AC3E}">
@@ -15281,6 +15268,47 @@
           <a:p>
             <a:pPr lvl="1"/>
             <a:endParaRPr lang="fr-FR" dirty="0"/>
+          </a:p>
+        </p:txBody>
+      </p:sp>
+      <p:sp>
+        <p:nvSpPr>
+          <p:cNvPr id="4" name="ZoneTexte 3">
+            <a:extLst>
+              <a:ext uri="{FF2B5EF4-FFF2-40B4-BE49-F238E27FC236}">
+                <a16:creationId xmlns:a16="http://schemas.microsoft.com/office/drawing/2014/main" id="{D561072C-1D00-5393-A28C-4267FC2EDD7A}"/>
+              </a:ext>
+            </a:extLst>
+          </p:cNvPr>
+          <p:cNvSpPr txBox="1"/>
+          <p:nvPr/>
+        </p:nvSpPr>
+        <p:spPr>
+          <a:xfrm rot="19731946">
+            <a:off x="270437" y="4945119"/>
+            <a:ext cx="1275734" cy="369332"/>
+          </a:xfrm>
+          <a:prstGeom prst="rect">
+            <a:avLst/>
+          </a:prstGeom>
+          <a:solidFill>
+            <a:srgbClr val="FF0000"/>
+          </a:solidFill>
+        </p:spPr>
+        <p:txBody>
+          <a:bodyPr wrap="none" rtlCol="0">
+            <a:spAutoFit/>
+          </a:bodyPr>
+          <a:lstStyle/>
+          <a:p>
+            <a:r>
+              <a:rPr lang="fr-FR" b="1" dirty="0">
+                <a:solidFill>
+                  <a:schemeClr val="bg1"/>
+                </a:solidFill>
+              </a:rPr>
+              <a:t>A REVOIR</a:t>
+            </a:r>
           </a:p>
         </p:txBody>
       </p:sp>

</xml_diff>